<commit_message>
Update Architectures of the internet of things.pptx
</commit_message>
<xml_diff>
--- a/Architechtures of the internet of things/Semester 2/IOT2/Architectures of the internet of things.pptx
+++ b/Architechtures of the internet of things/Semester 2/IOT2/Architectures of the internet of things.pptx
@@ -7,6 +7,10 @@
   <p:sldIdLst>
     <p:sldId id="256" r:id="rId2"/>
     <p:sldId id="257" r:id="rId3"/>
+    <p:sldId id="258" r:id="rId4"/>
+    <p:sldId id="259" r:id="rId5"/>
+    <p:sldId id="260" r:id="rId6"/>
+    <p:sldId id="261" r:id="rId7"/>
   </p:sldIdLst>
   <p:sldSz cx="12192000" cy="6858000"/>
   <p:notesSz cx="6858000" cy="9144000"/>
@@ -105,6 +109,11 @@
       </a:defRPr>
     </a:lvl9pPr>
   </p:defaultTextStyle>
+  <p:extLst>
+    <p:ext uri="{EFAFB233-063F-42B5-8137-9DF3F51BA10A}">
+      <p15:sldGuideLst xmlns:p15="http://schemas.microsoft.com/office/powerpoint/2012/main"/>
+    </p:ext>
+  </p:extLst>
 </p:presentation>
 </file>
 
@@ -278,7 +287,7 @@
           <a:p>
             <a:fld id="{48A87A34-81AB-432B-8DAE-1953F412C126}" type="datetimeFigureOut">
               <a:rPr lang="en-US" dirty="0"/>
-              <a:t>7/6/2019</a:t>
+              <a:t>7/7/2019</a:t>
             </a:fld>
             <a:endParaRPr lang="en-US" dirty="0"/>
           </a:p>
@@ -540,7 +549,7 @@
           <a:p>
             <a:fld id="{48A87A34-81AB-432B-8DAE-1953F412C126}" type="datetimeFigureOut">
               <a:rPr lang="en-US" dirty="0"/>
-              <a:t>7/6/2019</a:t>
+              <a:t>7/7/2019</a:t>
             </a:fld>
             <a:endParaRPr lang="en-US" dirty="0"/>
           </a:p>
@@ -767,7 +776,7 @@
             <a:fld id="{48A87A34-81AB-432B-8DAE-1953F412C126}" type="datetimeFigureOut">
               <a:rPr lang="en-US" dirty="0"/>
               <a:pPr/>
-              <a:t>7/6/2019</a:t>
+              <a:t>7/7/2019</a:t>
             </a:fld>
             <a:endParaRPr lang="en-US" dirty="0"/>
           </a:p>
@@ -1073,7 +1082,7 @@
             <a:fld id="{48A87A34-81AB-432B-8DAE-1953F412C126}" type="datetimeFigureOut">
               <a:rPr lang="en-US" dirty="0"/>
               <a:pPr/>
-              <a:t>7/6/2019</a:t>
+              <a:t>7/7/2019</a:t>
             </a:fld>
             <a:endParaRPr lang="en-US" dirty="0"/>
           </a:p>
@@ -1542,7 +1551,7 @@
             <a:fld id="{48A87A34-81AB-432B-8DAE-1953F412C126}" type="datetimeFigureOut">
               <a:rPr lang="en-US" dirty="0"/>
               <a:pPr/>
-              <a:t>7/6/2019</a:t>
+              <a:t>7/7/2019</a:t>
             </a:fld>
             <a:endParaRPr lang="en-US" dirty="0"/>
           </a:p>
@@ -2084,7 +2093,7 @@
           <a:p>
             <a:fld id="{48A87A34-81AB-432B-8DAE-1953F412C126}" type="datetimeFigureOut">
               <a:rPr lang="en-US" dirty="0"/>
-              <a:t>7/6/2019</a:t>
+              <a:t>7/7/2019</a:t>
             </a:fld>
             <a:endParaRPr lang="en-US" dirty="0"/>
           </a:p>
@@ -2853,7 +2862,7 @@
           <a:p>
             <a:fld id="{48A87A34-81AB-432B-8DAE-1953F412C126}" type="datetimeFigureOut">
               <a:rPr lang="en-US" dirty="0"/>
-              <a:t>7/6/2019</a:t>
+              <a:t>7/7/2019</a:t>
             </a:fld>
             <a:endParaRPr lang="en-US" dirty="0"/>
           </a:p>
@@ -3023,7 +3032,7 @@
           <a:p>
             <a:fld id="{48A87A34-81AB-432B-8DAE-1953F412C126}" type="datetimeFigureOut">
               <a:rPr lang="en-US" dirty="0"/>
-              <a:t>7/6/2019</a:t>
+              <a:t>7/7/2019</a:t>
             </a:fld>
             <a:endParaRPr lang="en-US" dirty="0"/>
           </a:p>
@@ -3242,7 +3251,7 @@
             <a:fld id="{48A87A34-81AB-432B-8DAE-1953F412C126}" type="datetimeFigureOut">
               <a:rPr lang="en-US" dirty="0"/>
               <a:pPr/>
-              <a:t>7/6/2019</a:t>
+              <a:t>7/7/2019</a:t>
             </a:fld>
             <a:endParaRPr lang="en-US" dirty="0"/>
           </a:p>
@@ -3417,7 +3426,7 @@
           <a:p>
             <a:fld id="{48A87A34-81AB-432B-8DAE-1953F412C126}" type="datetimeFigureOut">
               <a:rPr lang="en-US" dirty="0"/>
-              <a:t>7/6/2019</a:t>
+              <a:t>7/7/2019</a:t>
             </a:fld>
             <a:endParaRPr lang="en-US" dirty="0"/>
           </a:p>
@@ -3702,7 +3711,7 @@
             <a:fld id="{48A87A34-81AB-432B-8DAE-1953F412C126}" type="datetimeFigureOut">
               <a:rPr lang="en-US" dirty="0"/>
               <a:pPr/>
-              <a:t>7/6/2019</a:t>
+              <a:t>7/7/2019</a:t>
             </a:fld>
             <a:endParaRPr lang="en-US" dirty="0"/>
           </a:p>
@@ -3939,7 +3948,7 @@
           <a:p>
             <a:fld id="{48A87A34-81AB-432B-8DAE-1953F412C126}" type="datetimeFigureOut">
               <a:rPr lang="en-US" dirty="0"/>
-              <a:t>7/6/2019</a:t>
+              <a:t>7/7/2019</a:t>
             </a:fld>
             <a:endParaRPr lang="en-US" dirty="0"/>
           </a:p>
@@ -4313,7 +4322,7 @@
           <a:p>
             <a:fld id="{48A87A34-81AB-432B-8DAE-1953F412C126}" type="datetimeFigureOut">
               <a:rPr lang="en-US" dirty="0"/>
-              <a:t>7/6/2019</a:t>
+              <a:t>7/7/2019</a:t>
             </a:fld>
             <a:endParaRPr lang="en-US" dirty="0"/>
           </a:p>
@@ -4426,7 +4435,7 @@
           <a:p>
             <a:fld id="{48A87A34-81AB-432B-8DAE-1953F412C126}" type="datetimeFigureOut">
               <a:rPr lang="en-US" dirty="0"/>
-              <a:t>7/6/2019</a:t>
+              <a:t>7/7/2019</a:t>
             </a:fld>
             <a:endParaRPr lang="en-US" dirty="0"/>
           </a:p>
@@ -4516,7 +4525,7 @@
           <a:p>
             <a:fld id="{48A87A34-81AB-432B-8DAE-1953F412C126}" type="datetimeFigureOut">
               <a:rPr lang="en-US" dirty="0"/>
-              <a:t>7/6/2019</a:t>
+              <a:t>7/7/2019</a:t>
             </a:fld>
             <a:endParaRPr lang="en-US" dirty="0"/>
           </a:p>
@@ -4760,7 +4769,7 @@
           <a:p>
             <a:fld id="{48A87A34-81AB-432B-8DAE-1953F412C126}" type="datetimeFigureOut">
               <a:rPr lang="en-US" dirty="0"/>
-              <a:t>7/6/2019</a:t>
+              <a:t>7/7/2019</a:t>
             </a:fld>
             <a:endParaRPr lang="en-US" dirty="0"/>
           </a:p>
@@ -5012,7 +5021,7 @@
           <a:p>
             <a:fld id="{48A87A34-81AB-432B-8DAE-1953F412C126}" type="datetimeFigureOut">
               <a:rPr lang="en-US" dirty="0"/>
-              <a:t>7/6/2019</a:t>
+              <a:t>7/7/2019</a:t>
             </a:fld>
             <a:endParaRPr lang="en-US" dirty="0"/>
           </a:p>
@@ -5251,7 +5260,7 @@
             <a:fld id="{48A87A34-81AB-432B-8DAE-1953F412C126}" type="datetimeFigureOut">
               <a:rPr lang="en-US" dirty="0"/>
               <a:pPr/>
-              <a:t>7/6/2019</a:t>
+              <a:t>7/7/2019</a:t>
             </a:fld>
             <a:endParaRPr lang="en-US" dirty="0"/>
           </a:p>
@@ -5800,7 +5809,16 @@
           <a:bodyPr/>
           <a:lstStyle/>
           <a:p>
-            <a:endParaRPr lang="en-GB"/>
+            <a:r>
+              <a:rPr lang="en-GB" dirty="0"/>
+              <a:t>An Internet enabled smart device is a device that tends to be connected other smart devices and/or the internet via various wireless protocols such as WI-FI, LI-FI, NFC etc.</a:t>
+            </a:r>
+          </a:p>
+          <a:p>
+            <a:r>
+              <a:rPr lang="en-GB" dirty="0"/>
+              <a:t>The smart device in this presentation comprises of a Raspberry Pi 3 running Raspbian operating system connected to the IBM Bluemix platform for data capture and processing.</a:t>
+            </a:r>
           </a:p>
         </p:txBody>
       </p:sp>
@@ -5808,6 +5826,385 @@
     <p:extLst>
       <p:ext uri="{BB962C8B-B14F-4D97-AF65-F5344CB8AC3E}">
         <p14:creationId xmlns:p14="http://schemas.microsoft.com/office/powerpoint/2010/main" val="3935348139"/>
+      </p:ext>
+    </p:extLst>
+  </p:cSld>
+  <p:clrMapOvr>
+    <a:masterClrMapping/>
+  </p:clrMapOvr>
+</p:sld>
+</file>
+
+<file path=ppt/slides/slide3.xml><?xml version="1.0" encoding="utf-8"?>
+<p:sld xmlns:a="http://schemas.openxmlformats.org/drawingml/2006/main" xmlns:r="http://schemas.openxmlformats.org/officeDocument/2006/relationships" xmlns:p="http://schemas.openxmlformats.org/presentationml/2006/main">
+  <p:cSld>
+    <p:spTree>
+      <p:nvGrpSpPr>
+        <p:cNvPr id="1" name=""/>
+        <p:cNvGrpSpPr/>
+        <p:nvPr/>
+      </p:nvGrpSpPr>
+      <p:grpSpPr>
+        <a:xfrm>
+          <a:off x="0" y="0"/>
+          <a:ext cx="0" cy="0"/>
+          <a:chOff x="0" y="0"/>
+          <a:chExt cx="0" cy="0"/>
+        </a:xfrm>
+      </p:grpSpPr>
+      <p:sp>
+        <p:nvSpPr>
+          <p:cNvPr id="2" name="Title 1">
+            <a:extLst>
+              <a:ext uri="{FF2B5EF4-FFF2-40B4-BE49-F238E27FC236}">
+                <a16:creationId xmlns:a16="http://schemas.microsoft.com/office/drawing/2014/main" id="{27D0677F-4819-43A4-AC93-AA9C5D80014E}"/>
+              </a:ext>
+            </a:extLst>
+          </p:cNvPr>
+          <p:cNvSpPr>
+            <a:spLocks noGrp="1"/>
+          </p:cNvSpPr>
+          <p:nvPr>
+            <p:ph type="title"/>
+          </p:nvPr>
+        </p:nvSpPr>
+        <p:spPr/>
+        <p:txBody>
+          <a:bodyPr/>
+          <a:lstStyle/>
+          <a:p>
+            <a:r>
+              <a:rPr lang="en-GB" dirty="0"/>
+              <a:t>Methodology</a:t>
+            </a:r>
+          </a:p>
+        </p:txBody>
+      </p:sp>
+      <p:sp>
+        <p:nvSpPr>
+          <p:cNvPr id="3" name="Content Placeholder 2">
+            <a:extLst>
+              <a:ext uri="{FF2B5EF4-FFF2-40B4-BE49-F238E27FC236}">
+                <a16:creationId xmlns:a16="http://schemas.microsoft.com/office/drawing/2014/main" id="{0D5AAA69-AC49-4350-86A8-BE0FA977293B}"/>
+              </a:ext>
+            </a:extLst>
+          </p:cNvPr>
+          <p:cNvSpPr>
+            <a:spLocks noGrp="1"/>
+          </p:cNvSpPr>
+          <p:nvPr>
+            <p:ph idx="1"/>
+          </p:nvPr>
+        </p:nvSpPr>
+        <p:spPr/>
+        <p:txBody>
+          <a:bodyPr/>
+          <a:lstStyle/>
+          <a:p>
+            <a:r>
+              <a:rPr lang="en-GB" dirty="0"/>
+              <a:t>Setup Raspberry Pi for use</a:t>
+            </a:r>
+          </a:p>
+          <a:p>
+            <a:r>
+              <a:rPr lang="en-GB" dirty="0"/>
+              <a:t>Installed needed software</a:t>
+            </a:r>
+          </a:p>
+          <a:p>
+            <a:pPr lvl="1"/>
+            <a:r>
+              <a:rPr lang="en-GB" dirty="0"/>
+              <a:t>Node-red</a:t>
+            </a:r>
+          </a:p>
+          <a:p>
+            <a:r>
+              <a:rPr lang="en-GB" dirty="0"/>
+              <a:t>Connected Node-red to IBM Bluemix platform for data collection and processing</a:t>
+            </a:r>
+          </a:p>
+          <a:p>
+            <a:r>
+              <a:rPr lang="en-GB" dirty="0"/>
+              <a:t>Setup IBM Bluemix platform for data processing</a:t>
+            </a:r>
+          </a:p>
+        </p:txBody>
+      </p:sp>
+    </p:spTree>
+    <p:extLst>
+      <p:ext uri="{BB962C8B-B14F-4D97-AF65-F5344CB8AC3E}">
+        <p14:creationId xmlns:p14="http://schemas.microsoft.com/office/powerpoint/2010/main" val="1846675741"/>
+      </p:ext>
+    </p:extLst>
+  </p:cSld>
+  <p:clrMapOvr>
+    <a:masterClrMapping/>
+  </p:clrMapOvr>
+</p:sld>
+</file>
+
+<file path=ppt/slides/slide4.xml><?xml version="1.0" encoding="utf-8"?>
+<p:sld xmlns:a="http://schemas.openxmlformats.org/drawingml/2006/main" xmlns:r="http://schemas.openxmlformats.org/officeDocument/2006/relationships" xmlns:p="http://schemas.openxmlformats.org/presentationml/2006/main">
+  <p:cSld>
+    <p:spTree>
+      <p:nvGrpSpPr>
+        <p:cNvPr id="1" name=""/>
+        <p:cNvGrpSpPr/>
+        <p:nvPr/>
+      </p:nvGrpSpPr>
+      <p:grpSpPr>
+        <a:xfrm>
+          <a:off x="0" y="0"/>
+          <a:ext cx="0" cy="0"/>
+          <a:chOff x="0" y="0"/>
+          <a:chExt cx="0" cy="0"/>
+        </a:xfrm>
+      </p:grpSpPr>
+      <p:sp>
+        <p:nvSpPr>
+          <p:cNvPr id="2" name="Title 1">
+            <a:extLst>
+              <a:ext uri="{FF2B5EF4-FFF2-40B4-BE49-F238E27FC236}">
+                <a16:creationId xmlns:a16="http://schemas.microsoft.com/office/drawing/2014/main" id="{A6F1A3B7-FDFF-4DDE-81CE-8237F8A0518B}"/>
+              </a:ext>
+            </a:extLst>
+          </p:cNvPr>
+          <p:cNvSpPr>
+            <a:spLocks noGrp="1"/>
+          </p:cNvSpPr>
+          <p:nvPr>
+            <p:ph type="title"/>
+          </p:nvPr>
+        </p:nvSpPr>
+        <p:spPr/>
+        <p:txBody>
+          <a:bodyPr/>
+          <a:lstStyle/>
+          <a:p>
+            <a:r>
+              <a:rPr lang="en-GB" dirty="0"/>
+              <a:t>Features</a:t>
+            </a:r>
+          </a:p>
+        </p:txBody>
+      </p:sp>
+      <p:sp>
+        <p:nvSpPr>
+          <p:cNvPr id="3" name="Content Placeholder 2">
+            <a:extLst>
+              <a:ext uri="{FF2B5EF4-FFF2-40B4-BE49-F238E27FC236}">
+                <a16:creationId xmlns:a16="http://schemas.microsoft.com/office/drawing/2014/main" id="{9555841F-CE1E-42DF-9041-404A4FBE0DCC}"/>
+              </a:ext>
+            </a:extLst>
+          </p:cNvPr>
+          <p:cNvSpPr>
+            <a:spLocks noGrp="1"/>
+          </p:cNvSpPr>
+          <p:nvPr>
+            <p:ph idx="1"/>
+          </p:nvPr>
+        </p:nvSpPr>
+        <p:spPr/>
+        <p:txBody>
+          <a:bodyPr/>
+          <a:lstStyle/>
+          <a:p>
+            <a:r>
+              <a:rPr lang="en-GB" dirty="0"/>
+              <a:t>CPU temp of RPI is sent to IBM Bluemix and processed into a real time updating graph.</a:t>
+            </a:r>
+          </a:p>
+          <a:p>
+            <a:r>
+              <a:rPr lang="en-GB" dirty="0"/>
+              <a:t>Code has been implemented for an Arduino system to use a serial connection to get data to the RPI however this is untested as IBM Bluemix is unavailable.</a:t>
+            </a:r>
+          </a:p>
+        </p:txBody>
+      </p:sp>
+    </p:spTree>
+    <p:extLst>
+      <p:ext uri="{BB962C8B-B14F-4D97-AF65-F5344CB8AC3E}">
+        <p14:creationId xmlns:p14="http://schemas.microsoft.com/office/powerpoint/2010/main" val="2331042059"/>
+      </p:ext>
+    </p:extLst>
+  </p:cSld>
+  <p:clrMapOvr>
+    <a:masterClrMapping/>
+  </p:clrMapOvr>
+</p:sld>
+</file>
+
+<file path=ppt/slides/slide5.xml><?xml version="1.0" encoding="utf-8"?>
+<p:sld xmlns:a="http://schemas.openxmlformats.org/drawingml/2006/main" xmlns:r="http://schemas.openxmlformats.org/officeDocument/2006/relationships" xmlns:p="http://schemas.openxmlformats.org/presentationml/2006/main">
+  <p:cSld>
+    <p:spTree>
+      <p:nvGrpSpPr>
+        <p:cNvPr id="1" name=""/>
+        <p:cNvGrpSpPr/>
+        <p:nvPr/>
+      </p:nvGrpSpPr>
+      <p:grpSpPr>
+        <a:xfrm>
+          <a:off x="0" y="0"/>
+          <a:ext cx="0" cy="0"/>
+          <a:chOff x="0" y="0"/>
+          <a:chExt cx="0" cy="0"/>
+        </a:xfrm>
+      </p:grpSpPr>
+      <p:sp>
+        <p:nvSpPr>
+          <p:cNvPr id="2" name="Title 1">
+            <a:extLst>
+              <a:ext uri="{FF2B5EF4-FFF2-40B4-BE49-F238E27FC236}">
+                <a16:creationId xmlns:a16="http://schemas.microsoft.com/office/drawing/2014/main" id="{55E492CD-0CEA-4CF9-86E4-42F478A53117}"/>
+              </a:ext>
+            </a:extLst>
+          </p:cNvPr>
+          <p:cNvSpPr>
+            <a:spLocks noGrp="1"/>
+          </p:cNvSpPr>
+          <p:nvPr>
+            <p:ph type="title"/>
+          </p:nvPr>
+        </p:nvSpPr>
+        <p:spPr/>
+        <p:txBody>
+          <a:bodyPr/>
+          <a:lstStyle/>
+          <a:p>
+            <a:r>
+              <a:rPr lang="en-GB" dirty="0"/>
+              <a:t>Demonstration of product</a:t>
+            </a:r>
+          </a:p>
+        </p:txBody>
+      </p:sp>
+      <p:sp>
+        <p:nvSpPr>
+          <p:cNvPr id="3" name="Content Placeholder 2">
+            <a:extLst>
+              <a:ext uri="{FF2B5EF4-FFF2-40B4-BE49-F238E27FC236}">
+                <a16:creationId xmlns:a16="http://schemas.microsoft.com/office/drawing/2014/main" id="{26B7E4F8-3178-48E0-A8D4-4F2B6E55F079}"/>
+              </a:ext>
+            </a:extLst>
+          </p:cNvPr>
+          <p:cNvSpPr>
+            <a:spLocks noGrp="1"/>
+          </p:cNvSpPr>
+          <p:nvPr>
+            <p:ph idx="1"/>
+          </p:nvPr>
+        </p:nvSpPr>
+        <p:spPr/>
+        <p:txBody>
+          <a:bodyPr/>
+          <a:lstStyle/>
+          <a:p>
+            <a:endParaRPr lang="en-GB"/>
+          </a:p>
+        </p:txBody>
+      </p:sp>
+    </p:spTree>
+    <p:extLst>
+      <p:ext uri="{BB962C8B-B14F-4D97-AF65-F5344CB8AC3E}">
+        <p14:creationId xmlns:p14="http://schemas.microsoft.com/office/powerpoint/2010/main" val="2218778623"/>
+      </p:ext>
+    </p:extLst>
+  </p:cSld>
+  <p:clrMapOvr>
+    <a:masterClrMapping/>
+  </p:clrMapOvr>
+</p:sld>
+</file>
+
+<file path=ppt/slides/slide6.xml><?xml version="1.0" encoding="utf-8"?>
+<p:sld xmlns:a="http://schemas.openxmlformats.org/drawingml/2006/main" xmlns:r="http://schemas.openxmlformats.org/officeDocument/2006/relationships" xmlns:p="http://schemas.openxmlformats.org/presentationml/2006/main">
+  <p:cSld>
+    <p:spTree>
+      <p:nvGrpSpPr>
+        <p:cNvPr id="1" name=""/>
+        <p:cNvGrpSpPr/>
+        <p:nvPr/>
+      </p:nvGrpSpPr>
+      <p:grpSpPr>
+        <a:xfrm>
+          <a:off x="0" y="0"/>
+          <a:ext cx="0" cy="0"/>
+          <a:chOff x="0" y="0"/>
+          <a:chExt cx="0" cy="0"/>
+        </a:xfrm>
+      </p:grpSpPr>
+      <p:sp>
+        <p:nvSpPr>
+          <p:cNvPr id="2" name="Title 1">
+            <a:extLst>
+              <a:ext uri="{FF2B5EF4-FFF2-40B4-BE49-F238E27FC236}">
+                <a16:creationId xmlns:a16="http://schemas.microsoft.com/office/drawing/2014/main" id="{3A830A83-3A65-479A-A608-2CF983411C82}"/>
+              </a:ext>
+            </a:extLst>
+          </p:cNvPr>
+          <p:cNvSpPr>
+            <a:spLocks noGrp="1"/>
+          </p:cNvSpPr>
+          <p:nvPr>
+            <p:ph type="title"/>
+          </p:nvPr>
+        </p:nvSpPr>
+        <p:spPr/>
+        <p:txBody>
+          <a:bodyPr/>
+          <a:lstStyle/>
+          <a:p>
+            <a:r>
+              <a:rPr lang="en-GB" dirty="0"/>
+              <a:t>Next steps</a:t>
+            </a:r>
+          </a:p>
+        </p:txBody>
+      </p:sp>
+      <p:sp>
+        <p:nvSpPr>
+          <p:cNvPr id="3" name="Content Placeholder 2">
+            <a:extLst>
+              <a:ext uri="{FF2B5EF4-FFF2-40B4-BE49-F238E27FC236}">
+                <a16:creationId xmlns:a16="http://schemas.microsoft.com/office/drawing/2014/main" id="{929DE0F1-C849-4B8C-8FEC-AF83A3DA6D24}"/>
+              </a:ext>
+            </a:extLst>
+          </p:cNvPr>
+          <p:cNvSpPr>
+            <a:spLocks noGrp="1"/>
+          </p:cNvSpPr>
+          <p:nvPr>
+            <p:ph idx="1"/>
+          </p:nvPr>
+        </p:nvSpPr>
+        <p:spPr/>
+        <p:txBody>
+          <a:bodyPr/>
+          <a:lstStyle/>
+          <a:p>
+            <a:r>
+              <a:rPr lang="en-GB" dirty="0"/>
+              <a:t>Connecting the system to other internet enabled devices that use either WI-FI or LI-FI so that other areas of buildings can be monitored.</a:t>
+            </a:r>
+          </a:p>
+          <a:p>
+            <a:pPr lvl="1"/>
+            <a:r>
+              <a:rPr lang="en-GB" dirty="0"/>
+              <a:t>Devices would be fitted to monitor temperature humidity and light level.</a:t>
+            </a:r>
+          </a:p>
+        </p:txBody>
+      </p:sp>
+    </p:spTree>
+    <p:extLst>
+      <p:ext uri="{BB962C8B-B14F-4D97-AF65-F5344CB8AC3E}">
+        <p14:creationId xmlns:p14="http://schemas.microsoft.com/office/powerpoint/2010/main" val="4167527918"/>
       </p:ext>
     </p:extLst>
   </p:cSld>

</xml_diff>